<commit_message>
update report gaussian kernel question
</commit_message>
<xml_diff>
--- a/docs/report.pptx
+++ b/docs/report.pptx
@@ -3516,7 +3516,7 @@
           </a:ln>
           <a:extLst>
             <a:ext uri="{C572A759-6A51-4108-AA02-DFA0A04FC94B}">
-              <ma14:wrappingTextBoxFlag xmlns:ma14="http://schemas.microsoft.com/office/mac/drawingml/2011/main" xmlns:a14="http://schemas.microsoft.com/office/drawing/2010/main" xmlns:m="http://schemas.openxmlformats.org/officeDocument/2006/math" xmlns="" val="1"/>
+              <ma14:wrappingTextBoxFlag xmlns="" xmlns:m="http://schemas.openxmlformats.org/officeDocument/2006/math" xmlns:a14="http://schemas.microsoft.com/office/drawing/2010/main" xmlns:ma14="http://schemas.microsoft.com/office/mac/drawingml/2011/main" val="1"/>
             </a:ext>
           </a:extLst>
         </p:spPr>
@@ -3555,7 +3555,7 @@
           </a:ln>
           <a:extLst>
             <a:ext uri="{C572A759-6A51-4108-AA02-DFA0A04FC94B}">
-              <ma14:wrappingTextBoxFlag xmlns:ma14="http://schemas.microsoft.com/office/mac/drawingml/2011/main" xmlns:a14="http://schemas.microsoft.com/office/drawing/2010/main" xmlns:m="http://schemas.openxmlformats.org/officeDocument/2006/math" xmlns="" val="1"/>
+              <ma14:wrappingTextBoxFlag xmlns="" xmlns:m="http://schemas.openxmlformats.org/officeDocument/2006/math" xmlns:a14="http://schemas.microsoft.com/office/drawing/2010/main" xmlns:ma14="http://schemas.microsoft.com/office/mac/drawingml/2011/main" val="1"/>
             </a:ext>
           </a:extLst>
         </p:spPr>
@@ -4654,7 +4654,7 @@
           </a:prstGeom>
           <a:extLst>
             <a:ext uri="{C572A759-6A51-4108-AA02-DFA0A04FC94B}">
-              <ma14:wrappingTextBoxFlag xmlns:ma14="http://schemas.microsoft.com/office/mac/drawingml/2011/main" xmlns:a14="http://schemas.microsoft.com/office/drawing/2010/main" xmlns:m="http://schemas.openxmlformats.org/officeDocument/2006/math" xmlns="" val="1"/>
+              <ma14:wrappingTextBoxFlag xmlns="" xmlns:m="http://schemas.openxmlformats.org/officeDocument/2006/math" xmlns:a14="http://schemas.microsoft.com/office/drawing/2010/main" xmlns:ma14="http://schemas.microsoft.com/office/mac/drawingml/2011/main" val="1"/>
             </a:ext>
           </a:extLst>
         </p:spPr>
@@ -4838,7 +4838,7 @@
           </a:prstGeom>
           <a:extLst>
             <a:ext uri="{C572A759-6A51-4108-AA02-DFA0A04FC94B}">
-              <ma14:wrappingTextBoxFlag xmlns:ma14="http://schemas.microsoft.com/office/mac/drawingml/2011/main" xmlns:a14="http://schemas.microsoft.com/office/drawing/2010/main" xmlns:m="http://schemas.openxmlformats.org/officeDocument/2006/math" xmlns="" val="1"/>
+              <ma14:wrappingTextBoxFlag xmlns="" xmlns:m="http://schemas.openxmlformats.org/officeDocument/2006/math" xmlns:a14="http://schemas.microsoft.com/office/drawing/2010/main" xmlns:ma14="http://schemas.microsoft.com/office/mac/drawingml/2011/main" val="1"/>
             </a:ext>
           </a:extLst>
         </p:spPr>
@@ -5029,7 +5029,7 @@
           </a:ln>
           <a:extLst>
             <a:ext uri="{C572A759-6A51-4108-AA02-DFA0A04FC94B}">
-              <ma14:wrappingTextBoxFlag xmlns:ma14="http://schemas.microsoft.com/office/mac/drawingml/2011/main" xmlns:a14="http://schemas.microsoft.com/office/drawing/2010/main" xmlns:m="http://schemas.openxmlformats.org/officeDocument/2006/math" xmlns="" val="1"/>
+              <ma14:wrappingTextBoxFlag xmlns="" xmlns:m="http://schemas.openxmlformats.org/officeDocument/2006/math" xmlns:a14="http://schemas.microsoft.com/office/drawing/2010/main" xmlns:ma14="http://schemas.microsoft.com/office/mac/drawingml/2011/main" val="1"/>
             </a:ext>
           </a:extLst>
         </p:spPr>
@@ -5454,7 +5454,7 @@
           </a:prstGeom>
           <a:extLst>
             <a:ext uri="{C572A759-6A51-4108-AA02-DFA0A04FC94B}">
-              <ma14:wrappingTextBoxFlag xmlns:ma14="http://schemas.microsoft.com/office/mac/drawingml/2011/main" xmlns:a14="http://schemas.microsoft.com/office/drawing/2010/main" xmlns:m="http://schemas.openxmlformats.org/officeDocument/2006/math" xmlns="" val="1"/>
+              <ma14:wrappingTextBoxFlag xmlns="" xmlns:m="http://schemas.openxmlformats.org/officeDocument/2006/math" xmlns:a14="http://schemas.microsoft.com/office/drawing/2010/main" xmlns:ma14="http://schemas.microsoft.com/office/mac/drawingml/2011/main" val="1"/>
             </a:ext>
           </a:extLst>
         </p:spPr>
@@ -5591,7 +5591,7 @@
           </a:prstGeom>
           <a:extLst>
             <a:ext uri="{C572A759-6A51-4108-AA02-DFA0A04FC94B}">
-              <ma14:wrappingTextBoxFlag xmlns:ma14="http://schemas.microsoft.com/office/mac/drawingml/2011/main" xmlns:a14="http://schemas.microsoft.com/office/drawing/2010/main" xmlns:m="http://schemas.openxmlformats.org/officeDocument/2006/math" xmlns="" val="1"/>
+              <ma14:wrappingTextBoxFlag xmlns="" xmlns:m="http://schemas.openxmlformats.org/officeDocument/2006/math" xmlns:a14="http://schemas.microsoft.com/office/drawing/2010/main" xmlns:ma14="http://schemas.microsoft.com/office/mac/drawingml/2011/main" val="1"/>
             </a:ext>
           </a:extLst>
         </p:spPr>
@@ -5733,7 +5733,7 @@
           </a:prstGeom>
           <a:extLst>
             <a:ext uri="{C572A759-6A51-4108-AA02-DFA0A04FC94B}">
-              <ma14:wrappingTextBoxFlag xmlns="" xmlns:m="http://schemas.openxmlformats.org/officeDocument/2006/math" xmlns:a14="http://schemas.microsoft.com/office/drawing/2010/main" xmlns:ma14="http://schemas.microsoft.com/office/mac/drawingml/2011/main" val="1"/>
+              <ma14:wrappingTextBoxFlag xmlns:ma14="http://schemas.microsoft.com/office/mac/drawingml/2011/main" xmlns:a14="http://schemas.microsoft.com/office/drawing/2010/main" xmlns:m="http://schemas.openxmlformats.org/officeDocument/2006/math" xmlns="" val="1"/>
             </a:ext>
           </a:extLst>
         </p:spPr>
@@ -5883,7 +5883,7 @@
           </a:prstGeom>
           <a:extLst>
             <a:ext uri="{C572A759-6A51-4108-AA02-DFA0A04FC94B}">
-              <ma14:wrappingTextBoxFlag xmlns:ma14="http://schemas.microsoft.com/office/mac/drawingml/2011/main" xmlns:a14="http://schemas.microsoft.com/office/drawing/2010/main" xmlns:m="http://schemas.openxmlformats.org/officeDocument/2006/math" xmlns="" val="1"/>
+              <ma14:wrappingTextBoxFlag xmlns="" xmlns:m="http://schemas.openxmlformats.org/officeDocument/2006/math" xmlns:a14="http://schemas.microsoft.com/office/drawing/2010/main" xmlns:ma14="http://schemas.microsoft.com/office/mac/drawingml/2011/main" val="1"/>
             </a:ext>
           </a:extLst>
         </p:spPr>
@@ -6137,7 +6137,7 @@
           </a:prstGeom>
           <a:extLst>
             <a:ext uri="{C572A759-6A51-4108-AA02-DFA0A04FC94B}">
-              <ma14:wrappingTextBoxFlag xmlns:ma14="http://schemas.microsoft.com/office/mac/drawingml/2011/main" xmlns:a14="http://schemas.microsoft.com/office/drawing/2010/main" xmlns:m="http://schemas.openxmlformats.org/officeDocument/2006/math" xmlns="" val="1"/>
+              <ma14:wrappingTextBoxFlag xmlns="" xmlns:m="http://schemas.openxmlformats.org/officeDocument/2006/math" xmlns:a14="http://schemas.microsoft.com/office/drawing/2010/main" xmlns:ma14="http://schemas.microsoft.com/office/mac/drawingml/2011/main" val="1"/>
             </a:ext>
           </a:extLst>
         </p:spPr>
@@ -6292,7 +6292,7 @@
           </a:prstGeom>
           <a:extLst>
             <a:ext uri="{C572A759-6A51-4108-AA02-DFA0A04FC94B}">
-              <ma14:wrappingTextBoxFlag xmlns="" xmlns:m="http://schemas.openxmlformats.org/officeDocument/2006/math" xmlns:a14="http://schemas.microsoft.com/office/drawing/2010/main" xmlns:ma14="http://schemas.microsoft.com/office/mac/drawingml/2011/main" val="1"/>
+              <ma14:wrappingTextBoxFlag xmlns:ma14="http://schemas.microsoft.com/office/mac/drawingml/2011/main" xmlns:a14="http://schemas.microsoft.com/office/drawing/2010/main" xmlns:m="http://schemas.openxmlformats.org/officeDocument/2006/math" xmlns="" val="1"/>
             </a:ext>
           </a:extLst>
         </p:spPr>
@@ -6411,7 +6411,32 @@
           </a:lstStyle>
           <a:p>
             <a:r>
-              <a:t>[insert visualization of Gaussian kernel from project-1.ipynb here]</a:t>
+              <a:rPr dirty="0"/>
+              <a:t>[insert visualization of Gaussian kernel</a:t>
+            </a:r>
+            <a:r>
+              <a:rPr lang="en-US" dirty="0"/>
+              <a:t> </a:t>
+            </a:r>
+            <a:r>
+              <a:rPr dirty="0"/>
+              <a:t>from project-1.ipynb here]</a:t>
+            </a:r>
+            <a:endParaRPr lang="en-US" dirty="0"/>
+          </a:p>
+          <a:p>
+            <a:r>
+              <a:rPr lang="en-US" dirty="0"/>
+              <a:t>1D: </a:t>
+            </a:r>
+          </a:p>
+          <a:p>
+            <a:endParaRPr lang="en-US" dirty="0"/>
+          </a:p>
+          <a:p>
+            <a:r>
+              <a:rPr lang="en-US" dirty="0"/>
+              <a:t>2D:</a:t>
             </a:r>
           </a:p>
         </p:txBody>
@@ -6432,7 +6457,7 @@
           </a:prstGeom>
           <a:extLst>
             <a:ext uri="{C572A759-6A51-4108-AA02-DFA0A04FC94B}">
-              <ma14:wrappingTextBoxFlag xmlns:ma14="http://schemas.microsoft.com/office/mac/drawingml/2011/main" xmlns:a14="http://schemas.microsoft.com/office/drawing/2010/main" xmlns:m="http://schemas.openxmlformats.org/officeDocument/2006/math" xmlns="" val="1"/>
+              <ma14:wrappingTextBoxFlag xmlns="" xmlns:m="http://schemas.openxmlformats.org/officeDocument/2006/math" xmlns:a14="http://schemas.microsoft.com/office/drawing/2010/main" xmlns:ma14="http://schemas.microsoft.com/office/mac/drawingml/2011/main" val="1"/>
             </a:ext>
           </a:extLst>
         </p:spPr>
@@ -6584,7 +6609,7 @@
           </a:ln>
           <a:extLst>
             <a:ext uri="{C572A759-6A51-4108-AA02-DFA0A04FC94B}">
-              <ma14:wrappingTextBoxFlag xmlns:ma14="http://schemas.microsoft.com/office/mac/drawingml/2011/main" xmlns:a14="http://schemas.microsoft.com/office/drawing/2010/main" xmlns:m="http://schemas.openxmlformats.org/officeDocument/2006/math" xmlns="" val="1"/>
+              <ma14:wrappingTextBoxFlag xmlns="" xmlns:m="http://schemas.openxmlformats.org/officeDocument/2006/math" xmlns:a14="http://schemas.microsoft.com/office/drawing/2010/main" xmlns:ma14="http://schemas.microsoft.com/office/mac/drawingml/2011/main" val="1"/>
             </a:ext>
           </a:extLst>
         </p:spPr>
@@ -7084,7 +7109,7 @@
           </a:prstGeom>
           <a:extLst>
             <a:ext uri="{C572A759-6A51-4108-AA02-DFA0A04FC94B}">
-              <ma14:wrappingTextBoxFlag xmlns:ma14="http://schemas.microsoft.com/office/mac/drawingml/2011/main" xmlns:a14="http://schemas.microsoft.com/office/drawing/2010/main" xmlns:m="http://schemas.openxmlformats.org/officeDocument/2006/math" xmlns="" val="1"/>
+              <ma14:wrappingTextBoxFlag xmlns="" xmlns:m="http://schemas.openxmlformats.org/officeDocument/2006/math" xmlns:a14="http://schemas.microsoft.com/office/drawing/2010/main" xmlns:ma14="http://schemas.microsoft.com/office/mac/drawingml/2011/main" val="1"/>
             </a:ext>
           </a:extLst>
         </p:spPr>
@@ -7285,7 +7310,7 @@
           </a:prstGeom>
           <a:extLst>
             <a:ext uri="{C572A759-6A51-4108-AA02-DFA0A04FC94B}">
-              <ma14:wrappingTextBoxFlag xmlns:ma14="http://schemas.microsoft.com/office/mac/drawingml/2011/main" xmlns:a14="http://schemas.microsoft.com/office/drawing/2010/main" xmlns:m="http://schemas.openxmlformats.org/officeDocument/2006/math" xmlns="" val="1"/>
+              <ma14:wrappingTextBoxFlag xmlns="" xmlns:m="http://schemas.openxmlformats.org/officeDocument/2006/math" xmlns:a14="http://schemas.microsoft.com/office/drawing/2010/main" xmlns:ma14="http://schemas.microsoft.com/office/mac/drawingml/2011/main" val="1"/>
             </a:ext>
           </a:extLst>
         </p:spPr>
@@ -7431,7 +7456,7 @@
           </a:prstGeom>
           <a:extLst>
             <a:ext uri="{C572A759-6A51-4108-AA02-DFA0A04FC94B}">
-              <ma14:wrappingTextBoxFlag xmlns:ma14="http://schemas.microsoft.com/office/mac/drawingml/2011/main" xmlns:a14="http://schemas.microsoft.com/office/drawing/2010/main" xmlns:m="http://schemas.openxmlformats.org/officeDocument/2006/math" xmlns="" val="1"/>
+              <ma14:wrappingTextBoxFlag xmlns="" xmlns:m="http://schemas.openxmlformats.org/officeDocument/2006/math" xmlns:a14="http://schemas.microsoft.com/office/drawing/2010/main" xmlns:ma14="http://schemas.microsoft.com/office/mac/drawingml/2011/main" val="1"/>
             </a:ext>
           </a:extLst>
         </p:spPr>
@@ -7695,7 +7720,7 @@
           </a:prstGeom>
           <a:extLst>
             <a:ext uri="{C572A759-6A51-4108-AA02-DFA0A04FC94B}">
-              <ma14:wrappingTextBoxFlag xmlns:ma14="http://schemas.microsoft.com/office/mac/drawingml/2011/main" xmlns:a14="http://schemas.microsoft.com/office/drawing/2010/main" xmlns:m="http://schemas.openxmlformats.org/officeDocument/2006/math" xmlns="" val="1"/>
+              <ma14:wrappingTextBoxFlag xmlns="" xmlns:m="http://schemas.openxmlformats.org/officeDocument/2006/math" xmlns:a14="http://schemas.microsoft.com/office/drawing/2010/main" xmlns:ma14="http://schemas.microsoft.com/office/mac/drawingml/2011/main" val="1"/>
             </a:ext>
           </a:extLst>
         </p:spPr>
@@ -7959,7 +7984,7 @@
           </a:prstGeom>
           <a:extLst>
             <a:ext uri="{C572A759-6A51-4108-AA02-DFA0A04FC94B}">
-              <ma14:wrappingTextBoxFlag xmlns:ma14="http://schemas.microsoft.com/office/mac/drawingml/2011/main" xmlns:a14="http://schemas.microsoft.com/office/drawing/2010/main" xmlns:m="http://schemas.openxmlformats.org/officeDocument/2006/math" xmlns="" val="1"/>
+              <ma14:wrappingTextBoxFlag xmlns="" xmlns:m="http://schemas.openxmlformats.org/officeDocument/2006/math" xmlns:a14="http://schemas.microsoft.com/office/drawing/2010/main" xmlns:ma14="http://schemas.microsoft.com/office/mac/drawingml/2011/main" val="1"/>
             </a:ext>
           </a:extLst>
         </p:spPr>
@@ -8171,7 +8196,7 @@
           </a:prstGeom>
           <a:extLst>
             <a:ext uri="{C572A759-6A51-4108-AA02-DFA0A04FC94B}">
-              <ma14:wrappingTextBoxFlag xmlns:ma14="http://schemas.microsoft.com/office/mac/drawingml/2011/main" xmlns:a14="http://schemas.microsoft.com/office/drawing/2010/main" xmlns:m="http://schemas.openxmlformats.org/officeDocument/2006/math" xmlns="" val="1"/>
+              <ma14:wrappingTextBoxFlag xmlns="" xmlns:m="http://schemas.openxmlformats.org/officeDocument/2006/math" xmlns:a14="http://schemas.microsoft.com/office/drawing/2010/main" xmlns:ma14="http://schemas.microsoft.com/office/mac/drawingml/2011/main" val="1"/>
             </a:ext>
           </a:extLst>
         </p:spPr>
@@ -8326,7 +8351,7 @@
           </a:prstGeom>
           <a:extLst>
             <a:ext uri="{C572A759-6A51-4108-AA02-DFA0A04FC94B}">
-              <ma14:wrappingTextBoxFlag xmlns:ma14="http://schemas.microsoft.com/office/mac/drawingml/2011/main" xmlns:a14="http://schemas.microsoft.com/office/drawing/2010/main" xmlns:m="http://schemas.openxmlformats.org/officeDocument/2006/math" xmlns="" val="1"/>
+              <ma14:wrappingTextBoxFlag xmlns="" xmlns:m="http://schemas.openxmlformats.org/officeDocument/2006/math" xmlns:a14="http://schemas.microsoft.com/office/drawing/2010/main" xmlns:ma14="http://schemas.microsoft.com/office/mac/drawingml/2011/main" val="1"/>
             </a:ext>
           </a:extLst>
         </p:spPr>

</xml_diff>

<commit_message>
Part 4 aliasing bug fix
</commit_message>
<xml_diff>
--- a/docs/report.pptx
+++ b/docs/report.pptx
@@ -145,6 +145,11 @@
       </a:defRPr>
     </a:lvl9pPr>
   </p:defaultTextStyle>
+  <p:extLst>
+    <p:ext uri="{EFAFB233-063F-42B5-8137-9DF3F51BA10A}">
+      <p15:sldGuideLst xmlns:p15="http://schemas.microsoft.com/office/powerpoint/2012/main"/>
+    </p:ext>
+  </p:extLst>
 </p:presentation>
 </file>
 
@@ -18506,7 +18511,7 @@
               </a:tabLst>
             </a:pPr>
             <a:r>
-              <a:rPr lang="en-US" sz="1400" b="0" strike="noStrike" spc="-1">
+              <a:rPr lang="en-US" sz="1400" b="0" strike="noStrike" spc="-1" dirty="0">
                 <a:solidFill>
                   <a:schemeClr val="accent2">
                     <a:lumOff val="21760"/>
@@ -18517,7 +18522,7 @@
               </a:rPr>
               <a:t>[Insert the visualizations of the 2D Gaussian in the spatial and frequency domain]</a:t>
             </a:r>
-            <a:endParaRPr lang="en-US" sz="1400" b="0" strike="noStrike" spc="-1">
+            <a:endParaRPr lang="en-US" sz="1400" b="0" strike="noStrike" spc="-1" dirty="0">
               <a:solidFill>
                 <a:schemeClr val="accent2">
                   <a:lumOff val="21760"/>
@@ -18567,7 +18572,7 @@
               </a:tabLst>
             </a:pPr>
             <a:r>
-              <a:rPr lang="en-US" sz="1400" b="0" strike="noStrike" spc="-1">
+              <a:rPr lang="en-US" sz="1400" b="0" strike="noStrike" spc="-1" dirty="0">
                 <a:solidFill>
                   <a:schemeClr val="accent2">
                     <a:lumOff val="21760"/>
@@ -18576,9 +18581,33 @@
                 <a:latin typeface="Arial"/>
                 <a:ea typeface="Arial"/>
               </a:rPr>
-              <a:t>[Why does our frequency domain representation of a Gaussian not look like a Gaussian itself? How could we adjust the kernel to make these look more similar?]</a:t>
+              <a:t>[Try out some different cutoff values for the 2D Gaussian. </a:t>
             </a:r>
-            <a:endParaRPr lang="en-US" sz="1400" b="0" strike="noStrike" spc="-1">
+            <a:r>
+              <a:rPr lang="en-US" sz="1400" spc="-1" dirty="0">
+                <a:solidFill>
+                  <a:schemeClr val="accent2">
+                    <a:lumOff val="21760"/>
+                  </a:schemeClr>
+                </a:solidFill>
+                <a:latin typeface="Arial"/>
+                <a:ea typeface="Arial"/>
+              </a:rPr>
+              <a:t>What relationship do you notice between the cutoff value and the frequency domain representation? Why is that?</a:t>
+            </a:r>
+            <a:r>
+              <a:rPr lang="en-US" sz="1400" b="0" strike="noStrike" spc="-1" dirty="0">
+                <a:solidFill>
+                  <a:schemeClr val="accent2">
+                    <a:lumOff val="21760"/>
+                  </a:schemeClr>
+                </a:solidFill>
+                <a:latin typeface="Arial"/>
+                <a:ea typeface="Arial"/>
+              </a:rPr>
+              <a:t>]</a:t>
+            </a:r>
+            <a:endParaRPr lang="en-US" sz="1400" b="0" strike="noStrike" spc="-1" dirty="0">
               <a:solidFill>
                 <a:schemeClr val="accent2">
                   <a:lumOff val="21760"/>

</xml_diff>

<commit_message>
New part 4 question
</commit_message>
<xml_diff>
--- a/docs/report.pptx
+++ b/docs/report.pptx
@@ -18882,7 +18882,7 @@
               </a:tabLst>
             </a:pPr>
             <a:r>
-              <a:rPr lang="en-US" sz="1400" b="0" strike="noStrike" spc="-1">
+              <a:rPr lang="en-US" sz="1400" b="0" strike="noStrike" spc="-1" dirty="0">
                 <a:solidFill>
                   <a:schemeClr val="accent2">
                     <a:lumOff val="21760"/>
@@ -18893,7 +18893,7 @@
               </a:rPr>
               <a:t>[Insert the visualizations of the mystery image in the spatial and frequency domain]</a:t>
             </a:r>
-            <a:endParaRPr lang="en-US" sz="1400" b="0" strike="noStrike" spc="-1">
+            <a:endParaRPr lang="en-US" sz="1400" b="0" strike="noStrike" spc="-1" dirty="0">
               <a:solidFill>
                 <a:schemeClr val="accent2">
                   <a:lumOff val="21760"/>
@@ -19609,7 +19609,7 @@
               </a:tabLst>
             </a:pPr>
             <a:r>
-              <a:rPr lang="en-US" sz="1400" b="0" strike="noStrike" spc="-1">
+              <a:rPr lang="en-US" sz="1400" b="0" strike="noStrike" spc="-1" dirty="0">
                 <a:solidFill>
                   <a:schemeClr val="accent2">
                     <a:lumOff val="21760"/>
@@ -19620,7 +19620,7 @@
               </a:rPr>
               <a:t>[What factors limit the potential uses of deconvolution in the real world? Give two possible factors]</a:t>
             </a:r>
-            <a:endParaRPr lang="en-US" sz="1400" b="0" strike="noStrike" spc="-1">
+            <a:endParaRPr lang="en-US" sz="1400" b="0" strike="noStrike" spc="-1" dirty="0">
               <a:solidFill>
                 <a:schemeClr val="accent2">
                   <a:lumOff val="21760"/>
@@ -19677,18 +19677,17 @@
               </a:tabLst>
             </a:pPr>
             <a:r>
-              <a:rPr lang="en-US" sz="1400" b="0" strike="noStrike" spc="-1">
+              <a:rPr lang="en-US" sz="1400" b="0" strike="noStrike" spc="-1" dirty="0">
                 <a:solidFill>
                   <a:schemeClr val="accent2">
                     <a:lumOff val="21760"/>
                   </a:schemeClr>
                 </a:solidFill>
                 <a:latin typeface="Arial"/>
-                <a:ea typeface="Arial"/>
               </a:rPr>
-              <a:t>[We performed two convolutions of the dog image with the same Gaussian (one in the spatial domain, one in the frequency domain). How do the two compare, and why might they be different?]</a:t>
+              <a:t>[Describe any structures found in the frequency domain of the mystery image and explain what it’s caused by.]</a:t>
             </a:r>
-            <a:endParaRPr lang="en-US" sz="1400" b="0" strike="noStrike" spc="-1">
+            <a:endParaRPr lang="en-US" sz="1400" b="0" strike="noStrike" spc="-1" dirty="0">
               <a:solidFill>
                 <a:srgbClr val="000000"/>
               </a:solidFill>

</xml_diff>